<commit_message>
word fixes in the beggingijng
</commit_message>
<xml_diff>
--- a/CS-6220/hw/Grad_Project/Paxos Algorithm.pptx
+++ b/CS-6220/hw/Grad_Project/Paxos Algorithm.pptx
@@ -5269,14 +5269,22 @@
             </a:r>
             <a:r>
               <a:rPr lang="en-US" dirty="0"/>
-              <a:t>, a researcher in distributed algorithms and creator of LaTeX. The Part-Time Parliament</a:t>
+              <a:t>, a researcher in distributed algorithms and creator of LaTeX</a:t>
+            </a:r>
+            <a:r>
+              <a:rPr lang="en-US"/>
+              <a:t>. </a:t>
             </a:r>
           </a:p>
           <a:p>
             <a:pPr lvl="1"/>
             <a:r>
-              <a:rPr lang="en-US" dirty="0"/>
-              <a:t>The paper title was “The Part-Time Parliament” publish in ACM 1998.</a:t>
+              <a:rPr lang="en-US"/>
+              <a:t>The </a:t>
+            </a:r>
+            <a:r>
+              <a:rPr lang="en-US" dirty="0"/>
+              <a:t>paper title was “The Part-Time Parliament” publish in ACM 1998.</a:t>
             </a:r>
           </a:p>
           <a:p>

</xml_diff>

<commit_message>
saving work for now
</commit_message>
<xml_diff>
--- a/CS-6220/hw/Grad_Project/Paxos Algorithm.pptx
+++ b/CS-6220/hw/Grad_Project/Paxos Algorithm.pptx
@@ -884,6 +884,16 @@
               <a:t> focuses more on the data transferred, can be any size. However, security issues are prevalent. </a:t>
             </a:r>
           </a:p>
+          <a:p>
+            <a:pPr marL="171450" indent="-171450">
+              <a:buFontTx/>
+              <a:buChar char="-"/>
+            </a:pPr>
+            <a:r>
+              <a:rPr lang="en-US" dirty="0"/>
+              <a:t>Years of papers published 2004, 2009, 2010</a:t>
+            </a:r>
+          </a:p>
         </p:txBody>
       </p:sp>
       <p:sp>
@@ -966,7 +976,10 @@
           <a:bodyPr/>
           <a:lstStyle/>
           <a:p>
-            <a:endParaRPr lang="en-US" dirty="0"/>
+            <a:r>
+              <a:rPr lang="en-US" dirty="0"/>
+              <a:t>- Don’t actually need learners. Consensus is reached anyways.</a:t>
+            </a:r>
           </a:p>
         </p:txBody>
       </p:sp>
@@ -4671,11 +4684,31 @@
           <a:p>
             <a:r>
               <a:rPr lang="en-US" dirty="0"/>
-              <a:t>  </a:t>
-            </a:r>
-          </a:p>
-          <a:p>
-            <a:endParaRPr lang="en-US" b="1" dirty="0"/>
+              <a:t>  We use the definition of privacy parameter as differential privacy.  </a:t>
+            </a:r>
+            <a:r>
+              <a:rPr lang="en-US" dirty="0">
+                <a:latin typeface="Gill Sans MT(Body)"/>
+              </a:rPr>
+              <a:t>The </a:t>
+            </a:r>
+            <a:r>
+              <a:rPr lang="el-GR" b="1" dirty="0">
+                <a:latin typeface="Gill Sans MT(Body)"/>
+                <a:cs typeface="Times New Roman" panose="02020603050405020304" pitchFamily="18" charset="0"/>
+              </a:rPr>
+              <a:t>ε</a:t>
+            </a:r>
+            <a:r>
+              <a:rPr lang="en-US" dirty="0">
+                <a:latin typeface="Gill Sans MT(Body)"/>
+                <a:cs typeface="Times New Roman" panose="02020603050405020304" pitchFamily="18" charset="0"/>
+              </a:rPr>
+              <a:t> value between the continuous domain of [-1, 1] is our value to be proposed and accepted.</a:t>
+            </a:r>
+            <a:endParaRPr lang="en-US" b="1" dirty="0">
+              <a:latin typeface="Gill Sans MT(Body)"/>
+            </a:endParaRPr>
           </a:p>
           <a:p>
             <a:endParaRPr lang="en-US" dirty="0"/>
@@ -5246,7 +5279,7 @@
         <p:spPr>
           <a:xfrm>
             <a:off x="2231136" y="2638044"/>
-            <a:ext cx="7729728" cy="3666503"/>
+            <a:ext cx="7729728" cy="4001747"/>
           </a:xfrm>
         </p:spPr>
         <p:txBody>
@@ -5269,22 +5302,14 @@
             </a:r>
             <a:r>
               <a:rPr lang="en-US" dirty="0"/>
-              <a:t>, a researcher in distributed algorithms and creator of LaTeX</a:t>
-            </a:r>
-            <a:r>
-              <a:rPr lang="en-US"/>
-              <a:t>. </a:t>
+              <a:t>, a researcher in distributed algorithms and creator of LaTeX. </a:t>
             </a:r>
           </a:p>
           <a:p>
             <a:pPr lvl="1"/>
             <a:r>
-              <a:rPr lang="en-US"/>
-              <a:t>The </a:t>
-            </a:r>
-            <a:r>
-              <a:rPr lang="en-US" dirty="0"/>
-              <a:t>paper title was “The Part-Time Parliament” publish in ACM 1998.</a:t>
+              <a:rPr lang="en-US" dirty="0"/>
+              <a:t>The paper title was “The Part-Time Parliament” publish in ACM 1998.</a:t>
             </a:r>
           </a:p>
           <a:p>
@@ -5363,6 +5388,21 @@
             <a:r>
               <a:rPr lang="en-US" dirty="0"/>
               <a:t>.</a:t>
+            </a:r>
+          </a:p>
+          <a:p>
+            <a:pPr lvl="1"/>
+            <a:r>
+              <a:rPr lang="en-US" dirty="0"/>
+              <a:t>Google Paper: “</a:t>
+            </a:r>
+            <a:r>
+              <a:rPr lang="en-US" dirty="0" err="1"/>
+              <a:t>Paxos</a:t>
+            </a:r>
+            <a:r>
+              <a:rPr lang="en-US" dirty="0"/>
+              <a:t> Made Live”</a:t>
             </a:r>
           </a:p>
         </p:txBody>
@@ -5456,7 +5496,15 @@
           <a:p>
             <a:r>
               <a:rPr lang="en-US" dirty="0"/>
-              <a:t>Still relevant in today’s distributed world.</a:t>
+              <a:t>Still relevant in today’s distributed world, new implementations of </a:t>
+            </a:r>
+            <a:r>
+              <a:rPr lang="en-US" dirty="0" err="1"/>
+              <a:t>Paxos</a:t>
+            </a:r>
+            <a:r>
+              <a:rPr lang="en-US" dirty="0"/>
+              <a:t> happen with every new paper published. </a:t>
             </a:r>
           </a:p>
           <a:p>
@@ -5568,12 +5616,12 @@
         <p:spPr>
           <a:xfrm>
             <a:off x="2231136" y="2469601"/>
-            <a:ext cx="7729728" cy="4027452"/>
+            <a:ext cx="7729728" cy="4284490"/>
           </a:xfrm>
         </p:spPr>
         <p:txBody>
           <a:bodyPr>
-            <a:normAutofit/>
+            <a:normAutofit lnSpcReduction="10000"/>
           </a:bodyPr>
           <a:lstStyle/>
           <a:p>
@@ -5593,7 +5641,7 @@
             </a:r>
             <a:r>
               <a:rPr lang="en-US" dirty="0"/>
-              <a:t> uses a ledger of suggestions to keep track of proposed Messages and achieves consensus when</a:t>
+              <a:t> uses a ledger of suggestions to keep track of proposed Messages.</a:t>
             </a:r>
           </a:p>
           <a:p>
@@ -5615,6 +5663,17 @@
               <a:rPr lang="en-US" dirty="0"/>
               <a:t>Any peer can accept Messages and then either choose to accept or not accept the value. They send the Proposer(s) a Message with their answer.</a:t>
             </a:r>
+          </a:p>
+          <a:p>
+            <a:r>
+              <a:rPr lang="en-US" b="1" dirty="0"/>
+              <a:t>Learners: </a:t>
+            </a:r>
+            <a:r>
+              <a:rPr lang="en-US" dirty="0"/>
+              <a:t>Proposers play the role of the learner to see if consensus has been reached. They track the majority in the quorum. </a:t>
+            </a:r>
+            <a:endParaRPr lang="en-US" b="1" dirty="0"/>
           </a:p>
           <a:p>
             <a:r>

</xml_diff>